<commit_message>
Controller standards + correction avec ajout de @DeleteMapping + amélioration de la recherche des livres
</commit_message>
<xml_diff>
--- a/Présentation.pptx
+++ b/Présentation.pptx
@@ -204,7 +204,7 @@
             <a:fld id="{2BBD12B1-DAA5-416A-AF06-04C9F2D5A493}" type="datetimeFigureOut">
               <a:rPr lang="fr-FR" smtClean="0"/>
               <a:pPr/>
-              <a:t>05/07/2021</a:t>
+              <a:t>08/07/2021</a:t>
             </a:fld>
             <a:endParaRPr lang="fr-FR"/>
           </a:p>
@@ -652,7 +652,7 @@
             <a:fld id="{3B224859-817B-4A74-9BCF-7BA92B9F5F80}" type="datetime1">
               <a:rPr lang="fr-FR" smtClean="0"/>
               <a:pPr/>
-              <a:t>05/07/2021</a:t>
+              <a:t>08/07/2021</a:t>
             </a:fld>
             <a:endParaRPr lang="fr-FR"/>
           </a:p>
@@ -819,7 +819,7 @@
             <a:fld id="{827FE89B-0130-4B43-AF6C-11DBB551C033}" type="datetime1">
               <a:rPr lang="fr-FR" smtClean="0"/>
               <a:pPr/>
-              <a:t>05/07/2021</a:t>
+              <a:t>08/07/2021</a:t>
             </a:fld>
             <a:endParaRPr lang="fr-FR"/>
           </a:p>
@@ -996,7 +996,7 @@
             <a:fld id="{49D4BD8A-9FC2-47BD-9078-A89C7BF7BD7A}" type="datetime1">
               <a:rPr lang="fr-FR" smtClean="0"/>
               <a:pPr/>
-              <a:t>05/07/2021</a:t>
+              <a:t>08/07/2021</a:t>
             </a:fld>
             <a:endParaRPr lang="fr-FR"/>
           </a:p>
@@ -1194,7 +1194,7 @@
             <a:fld id="{12E6D7AB-11D4-42ED-8600-C0B4A9E74040}" type="datetime1">
               <a:rPr lang="fr-FR" smtClean="0"/>
               <a:pPr/>
-              <a:t>05/07/2021</a:t>
+              <a:t>08/07/2021</a:t>
             </a:fld>
             <a:endParaRPr lang="fr-FR"/>
           </a:p>
@@ -1466,7 +1466,7 @@
             <a:fld id="{0B19C5E5-A170-4980-9521-4811C9DFAB07}" type="datetime1">
               <a:rPr lang="fr-FR" smtClean="0"/>
               <a:pPr/>
-              <a:t>05/07/2021</a:t>
+              <a:t>08/07/2021</a:t>
             </a:fld>
             <a:endParaRPr lang="fr-FR"/>
           </a:p>
@@ -1751,7 +1751,7 @@
             <a:fld id="{788461BD-006C-45F1-80AA-2E11BF7059BF}" type="datetime1">
               <a:rPr lang="fr-FR" smtClean="0"/>
               <a:pPr/>
-              <a:t>05/07/2021</a:t>
+              <a:t>08/07/2021</a:t>
             </a:fld>
             <a:endParaRPr lang="fr-FR"/>
           </a:p>
@@ -2238,7 +2238,7 @@
             <a:fld id="{15DFFD34-E3B2-42B6-959E-68E8D17165A0}" type="datetime1">
               <a:rPr lang="fr-FR" smtClean="0"/>
               <a:pPr/>
-              <a:t>05/07/2021</a:t>
+              <a:t>08/07/2021</a:t>
             </a:fld>
             <a:endParaRPr lang="fr-FR"/>
           </a:p>
@@ -2353,7 +2353,7 @@
             <a:fld id="{A480378D-B2CA-49DF-91E2-F619FD5968BB}" type="datetime1">
               <a:rPr lang="fr-FR" smtClean="0"/>
               <a:pPr/>
-              <a:t>05/07/2021</a:t>
+              <a:t>08/07/2021</a:t>
             </a:fld>
             <a:endParaRPr lang="fr-FR"/>
           </a:p>
@@ -2445,7 +2445,7 @@
             <a:fld id="{369F413E-7CA6-44F1-A4F1-D59388C219B0}" type="datetime1">
               <a:rPr lang="fr-FR" smtClean="0"/>
               <a:pPr/>
-              <a:t>05/07/2021</a:t>
+              <a:t>08/07/2021</a:t>
             </a:fld>
             <a:endParaRPr lang="fr-FR"/>
           </a:p>
@@ -2750,7 +2750,7 @@
             <a:fld id="{14F9518B-4C76-4154-8595-2C8C412FAEEF}" type="datetime1">
               <a:rPr lang="fr-FR" smtClean="0"/>
               <a:pPr/>
-              <a:t>05/07/2021</a:t>
+              <a:t>08/07/2021</a:t>
             </a:fld>
             <a:endParaRPr lang="fr-FR"/>
           </a:p>
@@ -3074,7 +3074,7 @@
             <a:fld id="{76873DF1-5ADE-400B-9466-622019F344FE}" type="datetime1">
               <a:rPr lang="fr-FR" smtClean="0"/>
               <a:pPr/>
-              <a:t>05/07/2021</a:t>
+              <a:t>08/07/2021</a:t>
             </a:fld>
             <a:endParaRPr lang="fr-FR"/>
           </a:p>
@@ -3300,7 +3300,7 @@
             <a:fld id="{8B594C2B-24EE-4F51-AEB3-EF70F19C83A3}" type="datetime1">
               <a:rPr lang="fr-FR" smtClean="0"/>
               <a:pPr/>
-              <a:t>05/07/2021</a:t>
+              <a:t>08/07/2021</a:t>
             </a:fld>
             <a:endParaRPr lang="fr-FR"/>
           </a:p>
@@ -4526,7 +4526,7 @@
                 <a:latin typeface="Times New Roman" pitchFamily="18" charset="0"/>
                 <a:cs typeface="Times New Roman" pitchFamily="18" charset="0"/>
               </a:rPr>
-              <a:t>Améliorations éventuelles</a:t>
+              <a:t>Améliorations </a:t>
             </a:r>
           </a:p>
         </p:txBody>
@@ -4540,7 +4540,7 @@
         <p:spPr>
           <a:xfrm>
             <a:off x="918386" y="1124744"/>
-            <a:ext cx="2781531" cy="369332"/>
+            <a:ext cx="4185761" cy="369332"/>
           </a:xfrm>
           <a:prstGeom prst="rect">
             <a:avLst/>
@@ -4557,7 +4557,14 @@
                 <a:latin typeface="Times New Roman" pitchFamily="18" charset="0"/>
                 <a:cs typeface="Times New Roman" pitchFamily="18" charset="0"/>
               </a:rPr>
-              <a:t>Modifier le système de prêt</a:t>
+              <a:t>Passer à la version deux du système </a:t>
+            </a:r>
+            <a:r>
+              <a:rPr lang="fr-FR" dirty="0" smtClean="0">
+                <a:latin typeface="Times New Roman" pitchFamily="18" charset="0"/>
+                <a:cs typeface="Times New Roman" pitchFamily="18" charset="0"/>
+              </a:rPr>
+              <a:t>de prêt</a:t>
             </a:r>
             <a:endParaRPr lang="fr-FR" dirty="0">
               <a:latin typeface="Times New Roman" pitchFamily="18" charset="0"/>
@@ -5684,6 +5691,88 @@
           </a:p>
         </p:txBody>
       </p:sp>
+      <p:sp>
+        <p:nvSpPr>
+          <p:cNvPr id="16" name="Rectangle 15"/>
+          <p:cNvSpPr/>
+          <p:nvPr/>
+        </p:nvSpPr>
+        <p:spPr>
+          <a:xfrm>
+            <a:off x="2483768" y="3212976"/>
+            <a:ext cx="4896544" cy="432048"/>
+          </a:xfrm>
+          <a:prstGeom prst="rect">
+            <a:avLst/>
+          </a:prstGeom>
+          <a:noFill/>
+        </p:spPr>
+        <p:style>
+          <a:lnRef idx="2">
+            <a:schemeClr val="accent1">
+              <a:shade val="50000"/>
+            </a:schemeClr>
+          </a:lnRef>
+          <a:fillRef idx="1">
+            <a:schemeClr val="accent1"/>
+          </a:fillRef>
+          <a:effectRef idx="0">
+            <a:schemeClr val="accent1"/>
+          </a:effectRef>
+          <a:fontRef idx="minor">
+            <a:schemeClr val="lt1"/>
+          </a:fontRef>
+        </p:style>
+        <p:txBody>
+          <a:bodyPr rtlCol="0" anchor="ctr"/>
+          <a:lstStyle/>
+          <a:p>
+            <a:pPr algn="ctr"/>
+            <a:endParaRPr lang="fr-FR"/>
+          </a:p>
+        </p:txBody>
+      </p:sp>
+      <p:sp>
+        <p:nvSpPr>
+          <p:cNvPr id="17" name="Rectangle 16"/>
+          <p:cNvSpPr/>
+          <p:nvPr/>
+        </p:nvSpPr>
+        <p:spPr>
+          <a:xfrm>
+            <a:off x="2555776" y="4221088"/>
+            <a:ext cx="5832648" cy="432048"/>
+          </a:xfrm>
+          <a:prstGeom prst="rect">
+            <a:avLst/>
+          </a:prstGeom>
+          <a:noFill/>
+        </p:spPr>
+        <p:style>
+          <a:lnRef idx="2">
+            <a:schemeClr val="accent1">
+              <a:shade val="50000"/>
+            </a:schemeClr>
+          </a:lnRef>
+          <a:fillRef idx="1">
+            <a:schemeClr val="accent1"/>
+          </a:fillRef>
+          <a:effectRef idx="0">
+            <a:schemeClr val="accent1"/>
+          </a:effectRef>
+          <a:fontRef idx="minor">
+            <a:schemeClr val="lt1"/>
+          </a:fontRef>
+        </p:style>
+        <p:txBody>
+          <a:bodyPr rtlCol="0" anchor="ctr"/>
+          <a:lstStyle/>
+          <a:p>
+            <a:pPr algn="ctr"/>
+            <a:endParaRPr lang="fr-FR"/>
+          </a:p>
+        </p:txBody>
+      </p:sp>
     </p:spTree>
   </p:cSld>
   <p:clrMapOvr>
@@ -6048,6 +6137,96 @@
                       </p:childTnLst>
                     </p:cTn>
                   </p:par>
+                  <p:par>
+                    <p:cTn id="33" fill="hold">
+                      <p:stCondLst>
+                        <p:cond delay="indefinite"/>
+                      </p:stCondLst>
+                      <p:childTnLst>
+                        <p:par>
+                          <p:cTn id="34" fill="hold">
+                            <p:stCondLst>
+                              <p:cond delay="0"/>
+                            </p:stCondLst>
+                            <p:childTnLst>
+                              <p:par>
+                                <p:cTn id="35" presetID="1" presetClass="entr" presetSubtype="0" fill="hold" grpId="0" nodeType="clickEffect">
+                                  <p:stCondLst>
+                                    <p:cond delay="0"/>
+                                  </p:stCondLst>
+                                  <p:childTnLst>
+                                    <p:set>
+                                      <p:cBhvr>
+                                        <p:cTn id="36" dur="1" fill="hold">
+                                          <p:stCondLst>
+                                            <p:cond delay="0"/>
+                                          </p:stCondLst>
+                                        </p:cTn>
+                                        <p:tgtEl>
+                                          <p:spTgt spid="16"/>
+                                        </p:tgtEl>
+                                        <p:attrNameLst>
+                                          <p:attrName>style.visibility</p:attrName>
+                                        </p:attrNameLst>
+                                      </p:cBhvr>
+                                      <p:to>
+                                        <p:strVal val="visible"/>
+                                      </p:to>
+                                    </p:set>
+                                  </p:childTnLst>
+                                </p:cTn>
+                              </p:par>
+                            </p:childTnLst>
+                          </p:cTn>
+                        </p:par>
+                      </p:childTnLst>
+                    </p:cTn>
+                  </p:par>
+                  <p:par>
+                    <p:cTn id="37" fill="hold">
+                      <p:stCondLst>
+                        <p:cond delay="indefinite"/>
+                      </p:stCondLst>
+                      <p:childTnLst>
+                        <p:par>
+                          <p:cTn id="38" fill="hold">
+                            <p:stCondLst>
+                              <p:cond delay="0"/>
+                            </p:stCondLst>
+                            <p:childTnLst>
+                              <p:par>
+                                <p:cTn id="39" presetID="1" presetClass="entr" presetSubtype="0" fill="hold" grpId="0" nodeType="clickEffect">
+                                  <p:stCondLst>
+                                    <p:cond delay="0"/>
+                                  </p:stCondLst>
+                                  <p:childTnLst>
+                                    <p:set>
+                                      <p:cBhvr>
+                                        <p:cTn id="40" dur="1" fill="hold">
+                                          <p:stCondLst>
+                                            <p:cond delay="0"/>
+                                          </p:stCondLst>
+                                        </p:cTn>
+                                        <p:tgtEl>
+                                          <p:spTgt spid="17"/>
+                                        </p:tgtEl>
+                                        <p:attrNameLst>
+                                          <p:attrName>style.visibility</p:attrName>
+                                        </p:attrNameLst>
+                                      </p:cBhvr>
+                                      <p:to>
+                                        <p:strVal val="visible"/>
+                                      </p:to>
+                                    </p:set>
+                                  </p:childTnLst>
+                                </p:cTn>
+                              </p:par>
+                            </p:childTnLst>
+                          </p:cTn>
+                        </p:par>
+                      </p:childTnLst>
+                    </p:cTn>
+                  </p:par>
                 </p:childTnLst>
               </p:cTn>
               <p:prevCondLst>
@@ -6079,6 +6258,8 @@
       <p:bldP spid="19" grpId="0" animBg="1"/>
       <p:bldP spid="14" grpId="0"/>
       <p:bldP spid="15" grpId="0" animBg="1"/>
+      <p:bldP spid="16" grpId="0" animBg="1"/>
+      <p:bldP spid="17" grpId="0" animBg="1"/>
     </p:bldLst>
   </p:timing>
 </p:sld>

</xml_diff>